<commit_message>
Лекция HTML5 canvas via JS
</commit_message>
<xml_diff>
--- a/lectures/javascript-canvas/slides.pptx
+++ b/lectures/javascript-canvas/slides.pptx
@@ -8,6 +8,15 @@
     <p:sldId id="256" r:id="rId2"/>
     <p:sldId id="257" r:id="rId3"/>
     <p:sldId id="258" r:id="rId4"/>
+    <p:sldId id="260" r:id="rId5"/>
+    <p:sldId id="259" r:id="rId6"/>
+    <p:sldId id="261" r:id="rId7"/>
+    <p:sldId id="262" r:id="rId8"/>
+    <p:sldId id="264" r:id="rId9"/>
+    <p:sldId id="263" r:id="rId10"/>
+    <p:sldId id="265" r:id="rId11"/>
+    <p:sldId id="266" r:id="rId12"/>
+    <p:sldId id="267" r:id="rId13"/>
   </p:sldIdLst>
   <p:sldSz cx="12192000" cy="6858000"/>
   <p:notesSz cx="6858000" cy="9144000"/>
@@ -106,6 +115,11 @@
       </a:defRPr>
     </a:lvl9pPr>
   </p:defaultTextStyle>
+  <p:extLst>
+    <p:ext uri="{EFAFB233-063F-42B5-8137-9DF3F51BA10A}">
+      <p15:sldGuideLst xmlns:p15="http://schemas.microsoft.com/office/powerpoint/2012/main"/>
+    </p:ext>
+  </p:extLst>
 </p:presentation>
 </file>
 
@@ -6062,6 +6076,253 @@
 </p:sld>
 </file>
 
+<file path=ppt/slides/slide10.xml><?xml version="1.0" encoding="utf-8"?>
+<p:sld xmlns:a="http://schemas.openxmlformats.org/drawingml/2006/main" xmlns:r="http://schemas.openxmlformats.org/officeDocument/2006/relationships" xmlns:p="http://schemas.openxmlformats.org/presentationml/2006/main">
+  <p:cSld>
+    <p:spTree>
+      <p:nvGrpSpPr>
+        <p:cNvPr id="1" name=""/>
+        <p:cNvGrpSpPr/>
+        <p:nvPr/>
+      </p:nvGrpSpPr>
+      <p:grpSpPr>
+        <a:xfrm>
+          <a:off x="0" y="0"/>
+          <a:ext cx="0" cy="0"/>
+          <a:chOff x="0" y="0"/>
+          <a:chExt cx="0" cy="0"/>
+        </a:xfrm>
+      </p:grpSpPr>
+      <p:sp>
+        <p:nvSpPr>
+          <p:cNvPr id="2" name="Title 1"/>
+          <p:cNvSpPr>
+            <a:spLocks noGrp="1"/>
+          </p:cNvSpPr>
+          <p:nvPr>
+            <p:ph type="title"/>
+          </p:nvPr>
+        </p:nvSpPr>
+        <p:spPr/>
+        <p:txBody>
+          <a:bodyPr/>
+          <a:lstStyle/>
+          <a:p>
+            <a:r>
+              <a:rPr lang="en-US" dirty="0" smtClean="0"/>
+              <a:t>DEMO 4</a:t>
+            </a:r>
+            <a:endParaRPr lang="ru-RU" dirty="0"/>
+          </a:p>
+        </p:txBody>
+      </p:sp>
+      <p:sp>
+        <p:nvSpPr>
+          <p:cNvPr id="3" name="Content Placeholder 2"/>
+          <p:cNvSpPr>
+            <a:spLocks noGrp="1"/>
+          </p:cNvSpPr>
+          <p:nvPr>
+            <p:ph idx="1"/>
+          </p:nvPr>
+        </p:nvSpPr>
+        <p:spPr/>
+        <p:txBody>
+          <a:bodyPr/>
+          <a:lstStyle/>
+          <a:p>
+            <a:endParaRPr lang="ru-RU"/>
+          </a:p>
+        </p:txBody>
+      </p:sp>
+    </p:spTree>
+    <p:extLst>
+      <p:ext uri="{BB962C8B-B14F-4D97-AF65-F5344CB8AC3E}">
+        <p14:creationId xmlns:p14="http://schemas.microsoft.com/office/powerpoint/2010/main" val="3809673946"/>
+      </p:ext>
+    </p:extLst>
+  </p:cSld>
+  <p:clrMapOvr>
+    <a:masterClrMapping/>
+  </p:clrMapOvr>
+</p:sld>
+</file>
+
+<file path=ppt/slides/slide11.xml><?xml version="1.0" encoding="utf-8"?>
+<p:sld xmlns:a="http://schemas.openxmlformats.org/drawingml/2006/main" xmlns:r="http://schemas.openxmlformats.org/officeDocument/2006/relationships" xmlns:p="http://schemas.openxmlformats.org/presentationml/2006/main">
+  <p:cSld>
+    <p:spTree>
+      <p:nvGrpSpPr>
+        <p:cNvPr id="1" name=""/>
+        <p:cNvGrpSpPr/>
+        <p:nvPr/>
+      </p:nvGrpSpPr>
+      <p:grpSpPr>
+        <a:xfrm>
+          <a:off x="0" y="0"/>
+          <a:ext cx="0" cy="0"/>
+          <a:chOff x="0" y="0"/>
+          <a:chExt cx="0" cy="0"/>
+        </a:xfrm>
+      </p:grpSpPr>
+      <p:sp>
+        <p:nvSpPr>
+          <p:cNvPr id="2" name="Title 1"/>
+          <p:cNvSpPr>
+            <a:spLocks noGrp="1"/>
+          </p:cNvSpPr>
+          <p:nvPr>
+            <p:ph type="title"/>
+          </p:nvPr>
+        </p:nvSpPr>
+        <p:spPr/>
+        <p:txBody>
+          <a:bodyPr/>
+          <a:lstStyle/>
+          <a:p>
+            <a:r>
+              <a:rPr lang="ru-RU" dirty="0" smtClean="0"/>
+              <a:t>Заключение</a:t>
+            </a:r>
+            <a:endParaRPr lang="ru-RU" dirty="0"/>
+          </a:p>
+        </p:txBody>
+      </p:sp>
+      <p:sp>
+        <p:nvSpPr>
+          <p:cNvPr id="3" name="Content Placeholder 2"/>
+          <p:cNvSpPr>
+            <a:spLocks noGrp="1"/>
+          </p:cNvSpPr>
+          <p:nvPr>
+            <p:ph idx="1"/>
+          </p:nvPr>
+        </p:nvSpPr>
+        <p:spPr/>
+        <p:txBody>
+          <a:bodyPr/>
+          <a:lstStyle/>
+          <a:p>
+            <a:r>
+              <a:rPr lang="ru-RU" dirty="0" smtClean="0"/>
+              <a:t>Анимация</a:t>
+            </a:r>
+          </a:p>
+          <a:p>
+            <a:r>
+              <a:rPr lang="ru-RU" dirty="0" smtClean="0"/>
+              <a:t>3</a:t>
+            </a:r>
+            <a:r>
+              <a:rPr lang="en-US" dirty="0" smtClean="0"/>
+              <a:t>D</a:t>
+            </a:r>
+          </a:p>
+          <a:p>
+            <a:r>
+              <a:rPr lang="en-US" dirty="0" err="1" smtClean="0"/>
+              <a:t>etc</a:t>
+            </a:r>
+            <a:endParaRPr lang="ru-RU" dirty="0"/>
+          </a:p>
+        </p:txBody>
+      </p:sp>
+    </p:spTree>
+    <p:extLst>
+      <p:ext uri="{BB962C8B-B14F-4D97-AF65-F5344CB8AC3E}">
+        <p14:creationId xmlns:p14="http://schemas.microsoft.com/office/powerpoint/2010/main" val="14251383"/>
+      </p:ext>
+    </p:extLst>
+  </p:cSld>
+  <p:clrMapOvr>
+    <a:masterClrMapping/>
+  </p:clrMapOvr>
+</p:sld>
+</file>
+
+<file path=ppt/slides/slide12.xml><?xml version="1.0" encoding="utf-8"?>
+<p:sld xmlns:a="http://schemas.openxmlformats.org/drawingml/2006/main" xmlns:r="http://schemas.openxmlformats.org/officeDocument/2006/relationships" xmlns:p="http://schemas.openxmlformats.org/presentationml/2006/main">
+  <p:cSld>
+    <p:spTree>
+      <p:nvGrpSpPr>
+        <p:cNvPr id="1" name=""/>
+        <p:cNvGrpSpPr/>
+        <p:nvPr/>
+      </p:nvGrpSpPr>
+      <p:grpSpPr>
+        <a:xfrm>
+          <a:off x="0" y="0"/>
+          <a:ext cx="0" cy="0"/>
+          <a:chOff x="0" y="0"/>
+          <a:chExt cx="0" cy="0"/>
+        </a:xfrm>
+      </p:grpSpPr>
+      <p:sp>
+        <p:nvSpPr>
+          <p:cNvPr id="2" name="Title 1"/>
+          <p:cNvSpPr>
+            <a:spLocks noGrp="1"/>
+          </p:cNvSpPr>
+          <p:nvPr>
+            <p:ph type="title"/>
+          </p:nvPr>
+        </p:nvSpPr>
+        <p:spPr/>
+        <p:txBody>
+          <a:bodyPr/>
+          <a:lstStyle/>
+          <a:p>
+            <a:r>
+              <a:rPr lang="ru-RU" dirty="0" smtClean="0"/>
+              <a:t>Задание</a:t>
+            </a:r>
+            <a:endParaRPr lang="ru-RU" dirty="0"/>
+          </a:p>
+        </p:txBody>
+      </p:sp>
+      <p:sp>
+        <p:nvSpPr>
+          <p:cNvPr id="3" name="Content Placeholder 2"/>
+          <p:cNvSpPr>
+            <a:spLocks noGrp="1"/>
+          </p:cNvSpPr>
+          <p:nvPr>
+            <p:ph idx="1"/>
+          </p:nvPr>
+        </p:nvSpPr>
+        <p:spPr/>
+        <p:txBody>
+          <a:bodyPr/>
+          <a:lstStyle/>
+          <a:p>
+            <a:r>
+              <a:rPr lang="ru-RU" dirty="0" smtClean="0"/>
+              <a:t>Нарисовать пейзаж</a:t>
+            </a:r>
+          </a:p>
+          <a:p>
+            <a:pPr lvl="1"/>
+            <a:r>
+              <a:rPr lang="ru-RU" dirty="0" smtClean="0"/>
+              <a:t>Анимировать смену времени суток</a:t>
+            </a:r>
+            <a:endParaRPr lang="ru-RU" dirty="0"/>
+          </a:p>
+        </p:txBody>
+      </p:sp>
+    </p:spTree>
+    <p:extLst>
+      <p:ext uri="{BB962C8B-B14F-4D97-AF65-F5344CB8AC3E}">
+        <p14:creationId xmlns:p14="http://schemas.microsoft.com/office/powerpoint/2010/main" val="3161730425"/>
+      </p:ext>
+    </p:extLst>
+  </p:cSld>
+  <p:clrMapOvr>
+    <a:masterClrMapping/>
+  </p:clrMapOvr>
+</p:sld>
+</file>
+
 <file path=ppt/slides/slide2.xml><?xml version="1.0" encoding="utf-8"?>
 <p:sld xmlns:a="http://schemas.openxmlformats.org/drawingml/2006/main" xmlns:r="http://schemas.openxmlformats.org/officeDocument/2006/relationships" xmlns:p="http://schemas.openxmlformats.org/presentationml/2006/main">
   <p:cSld>
@@ -6387,6 +6648,703 @@
     <p:extLst>
       <p:ext uri="{BB962C8B-B14F-4D97-AF65-F5344CB8AC3E}">
         <p14:creationId xmlns:p14="http://schemas.microsoft.com/office/powerpoint/2010/main" val="3372669060"/>
+      </p:ext>
+    </p:extLst>
+  </p:cSld>
+  <p:clrMapOvr>
+    <a:masterClrMapping/>
+  </p:clrMapOvr>
+</p:sld>
+</file>
+
+<file path=ppt/slides/slide4.xml><?xml version="1.0" encoding="utf-8"?>
+<p:sld xmlns:a="http://schemas.openxmlformats.org/drawingml/2006/main" xmlns:r="http://schemas.openxmlformats.org/officeDocument/2006/relationships" xmlns:p="http://schemas.openxmlformats.org/presentationml/2006/main">
+  <p:cSld>
+    <p:spTree>
+      <p:nvGrpSpPr>
+        <p:cNvPr id="1" name=""/>
+        <p:cNvGrpSpPr/>
+        <p:nvPr/>
+      </p:nvGrpSpPr>
+      <p:grpSpPr>
+        <a:xfrm>
+          <a:off x="0" y="0"/>
+          <a:ext cx="0" cy="0"/>
+          <a:chOff x="0" y="0"/>
+          <a:chExt cx="0" cy="0"/>
+        </a:xfrm>
+      </p:grpSpPr>
+      <p:sp>
+        <p:nvSpPr>
+          <p:cNvPr id="2" name="Title 1"/>
+          <p:cNvSpPr>
+            <a:spLocks noGrp="1"/>
+          </p:cNvSpPr>
+          <p:nvPr>
+            <p:ph type="title"/>
+          </p:nvPr>
+        </p:nvSpPr>
+        <p:spPr/>
+        <p:txBody>
+          <a:bodyPr/>
+          <a:lstStyle/>
+          <a:p>
+            <a:r>
+              <a:rPr lang="en-US" dirty="0" smtClean="0"/>
+              <a:t>DEMO 1</a:t>
+            </a:r>
+            <a:endParaRPr lang="ru-RU" dirty="0"/>
+          </a:p>
+        </p:txBody>
+      </p:sp>
+      <p:sp>
+        <p:nvSpPr>
+          <p:cNvPr id="3" name="Content Placeholder 2"/>
+          <p:cNvSpPr>
+            <a:spLocks noGrp="1"/>
+          </p:cNvSpPr>
+          <p:nvPr>
+            <p:ph idx="1"/>
+          </p:nvPr>
+        </p:nvSpPr>
+        <p:spPr/>
+        <p:txBody>
+          <a:bodyPr/>
+          <a:lstStyle/>
+          <a:p>
+            <a:endParaRPr lang="ru-RU" dirty="0"/>
+          </a:p>
+        </p:txBody>
+      </p:sp>
+    </p:spTree>
+    <p:extLst>
+      <p:ext uri="{BB962C8B-B14F-4D97-AF65-F5344CB8AC3E}">
+        <p14:creationId xmlns:p14="http://schemas.microsoft.com/office/powerpoint/2010/main" val="3869346318"/>
+      </p:ext>
+    </p:extLst>
+  </p:cSld>
+  <p:clrMapOvr>
+    <a:masterClrMapping/>
+  </p:clrMapOvr>
+</p:sld>
+</file>
+
+<file path=ppt/slides/slide5.xml><?xml version="1.0" encoding="utf-8"?>
+<p:sld xmlns:a="http://schemas.openxmlformats.org/drawingml/2006/main" xmlns:r="http://schemas.openxmlformats.org/officeDocument/2006/relationships" xmlns:p="http://schemas.openxmlformats.org/presentationml/2006/main">
+  <p:cSld>
+    <p:spTree>
+      <p:nvGrpSpPr>
+        <p:cNvPr id="1" name=""/>
+        <p:cNvGrpSpPr/>
+        <p:nvPr/>
+      </p:nvGrpSpPr>
+      <p:grpSpPr>
+        <a:xfrm>
+          <a:off x="0" y="0"/>
+          <a:ext cx="0" cy="0"/>
+          <a:chOff x="0" y="0"/>
+          <a:chExt cx="0" cy="0"/>
+        </a:xfrm>
+      </p:grpSpPr>
+      <p:sp>
+        <p:nvSpPr>
+          <p:cNvPr id="2" name="Title 1"/>
+          <p:cNvSpPr>
+            <a:spLocks noGrp="1"/>
+          </p:cNvSpPr>
+          <p:nvPr>
+            <p:ph type="title"/>
+          </p:nvPr>
+        </p:nvSpPr>
+        <p:spPr/>
+        <p:txBody>
+          <a:bodyPr/>
+          <a:lstStyle/>
+          <a:p>
+            <a:r>
+              <a:rPr lang="ru-RU" dirty="0" smtClean="0"/>
+              <a:t>Градиент</a:t>
+            </a:r>
+            <a:endParaRPr lang="ru-RU" dirty="0"/>
+          </a:p>
+        </p:txBody>
+      </p:sp>
+      <p:sp>
+        <p:nvSpPr>
+          <p:cNvPr id="3" name="Content Placeholder 2"/>
+          <p:cNvSpPr>
+            <a:spLocks noGrp="1"/>
+          </p:cNvSpPr>
+          <p:nvPr>
+            <p:ph idx="1"/>
+          </p:nvPr>
+        </p:nvSpPr>
+        <p:spPr/>
+        <p:txBody>
+          <a:bodyPr/>
+          <a:lstStyle/>
+          <a:p>
+            <a:r>
+              <a:rPr lang="ru-RU" dirty="0" smtClean="0"/>
+              <a:t>Линейный градиент – две точки</a:t>
+            </a:r>
+          </a:p>
+          <a:p>
+            <a:r>
+              <a:rPr lang="ru-RU" dirty="0" smtClean="0"/>
+              <a:t>Радиальный – две окружности</a:t>
+            </a:r>
+            <a:endParaRPr lang="ru-RU" dirty="0"/>
+          </a:p>
+        </p:txBody>
+      </p:sp>
+    </p:spTree>
+    <p:extLst>
+      <p:ext uri="{BB962C8B-B14F-4D97-AF65-F5344CB8AC3E}">
+        <p14:creationId xmlns:p14="http://schemas.microsoft.com/office/powerpoint/2010/main" val="4250610396"/>
+      </p:ext>
+    </p:extLst>
+  </p:cSld>
+  <p:clrMapOvr>
+    <a:masterClrMapping/>
+  </p:clrMapOvr>
+</p:sld>
+</file>
+
+<file path=ppt/slides/slide6.xml><?xml version="1.0" encoding="utf-8"?>
+<p:sld xmlns:a="http://schemas.openxmlformats.org/drawingml/2006/main" xmlns:r="http://schemas.openxmlformats.org/officeDocument/2006/relationships" xmlns:p="http://schemas.openxmlformats.org/presentationml/2006/main">
+  <p:cSld>
+    <p:spTree>
+      <p:nvGrpSpPr>
+        <p:cNvPr id="1" name=""/>
+        <p:cNvGrpSpPr/>
+        <p:nvPr/>
+      </p:nvGrpSpPr>
+      <p:grpSpPr>
+        <a:xfrm>
+          <a:off x="0" y="0"/>
+          <a:ext cx="0" cy="0"/>
+          <a:chOff x="0" y="0"/>
+          <a:chExt cx="0" cy="0"/>
+        </a:xfrm>
+      </p:grpSpPr>
+      <p:sp>
+        <p:nvSpPr>
+          <p:cNvPr id="2" name="Title 1"/>
+          <p:cNvSpPr>
+            <a:spLocks noGrp="1"/>
+          </p:cNvSpPr>
+          <p:nvPr>
+            <p:ph type="title"/>
+          </p:nvPr>
+        </p:nvSpPr>
+        <p:spPr/>
+        <p:txBody>
+          <a:bodyPr/>
+          <a:lstStyle/>
+          <a:p>
+            <a:r>
+              <a:rPr lang="en-US" dirty="0" smtClean="0"/>
+              <a:t>DEMO 2</a:t>
+            </a:r>
+            <a:endParaRPr lang="ru-RU" dirty="0"/>
+          </a:p>
+        </p:txBody>
+      </p:sp>
+      <p:sp>
+        <p:nvSpPr>
+          <p:cNvPr id="3" name="Content Placeholder 2"/>
+          <p:cNvSpPr>
+            <a:spLocks noGrp="1"/>
+          </p:cNvSpPr>
+          <p:nvPr>
+            <p:ph idx="1"/>
+          </p:nvPr>
+        </p:nvSpPr>
+        <p:spPr/>
+        <p:txBody>
+          <a:bodyPr/>
+          <a:lstStyle/>
+          <a:p>
+            <a:endParaRPr lang="ru-RU"/>
+          </a:p>
+        </p:txBody>
+      </p:sp>
+    </p:spTree>
+    <p:extLst>
+      <p:ext uri="{BB962C8B-B14F-4D97-AF65-F5344CB8AC3E}">
+        <p14:creationId xmlns:p14="http://schemas.microsoft.com/office/powerpoint/2010/main" val="1589802363"/>
+      </p:ext>
+    </p:extLst>
+  </p:cSld>
+  <p:clrMapOvr>
+    <a:masterClrMapping/>
+  </p:clrMapOvr>
+</p:sld>
+</file>
+
+<file path=ppt/slides/slide7.xml><?xml version="1.0" encoding="utf-8"?>
+<p:sld xmlns:a="http://schemas.openxmlformats.org/drawingml/2006/main" xmlns:r="http://schemas.openxmlformats.org/officeDocument/2006/relationships" xmlns:p="http://schemas.openxmlformats.org/presentationml/2006/main">
+  <p:cSld>
+    <p:spTree>
+      <p:nvGrpSpPr>
+        <p:cNvPr id="1" name=""/>
+        <p:cNvGrpSpPr/>
+        <p:nvPr/>
+      </p:nvGrpSpPr>
+      <p:grpSpPr>
+        <a:xfrm>
+          <a:off x="0" y="0"/>
+          <a:ext cx="0" cy="0"/>
+          <a:chOff x="0" y="0"/>
+          <a:chExt cx="0" cy="0"/>
+        </a:xfrm>
+      </p:grpSpPr>
+      <p:sp>
+        <p:nvSpPr>
+          <p:cNvPr id="2" name="Title 1"/>
+          <p:cNvSpPr>
+            <a:spLocks noGrp="1"/>
+          </p:cNvSpPr>
+          <p:nvPr>
+            <p:ph type="title"/>
+          </p:nvPr>
+        </p:nvSpPr>
+        <p:spPr/>
+        <p:txBody>
+          <a:bodyPr/>
+          <a:lstStyle/>
+          <a:p>
+            <a:r>
+              <a:rPr lang="ru-RU" dirty="0" smtClean="0"/>
+              <a:t>Рисование</a:t>
+            </a:r>
+            <a:endParaRPr lang="ru-RU" dirty="0"/>
+          </a:p>
+        </p:txBody>
+      </p:sp>
+      <p:sp>
+        <p:nvSpPr>
+          <p:cNvPr id="3" name="Content Placeholder 2"/>
+          <p:cNvSpPr>
+            <a:spLocks noGrp="1"/>
+          </p:cNvSpPr>
+          <p:nvPr>
+            <p:ph idx="1"/>
+          </p:nvPr>
+        </p:nvSpPr>
+        <p:spPr/>
+        <p:txBody>
+          <a:bodyPr/>
+          <a:lstStyle/>
+          <a:p>
+            <a:r>
+              <a:rPr lang="en-US" dirty="0" smtClean="0"/>
+              <a:t>Path – </a:t>
+            </a:r>
+            <a:r>
+              <a:rPr lang="ru-RU" dirty="0" smtClean="0"/>
+              <a:t>путь для рисования ручкой (</a:t>
+            </a:r>
+            <a:r>
+              <a:rPr lang="en-US" dirty="0" smtClean="0"/>
+              <a:t>Pen</a:t>
+            </a:r>
+            <a:r>
+              <a:rPr lang="ru-RU" dirty="0" smtClean="0"/>
+              <a:t>)</a:t>
+            </a:r>
+          </a:p>
+          <a:p>
+            <a:pPr lvl="1"/>
+            <a:r>
+              <a:rPr lang="en-US" dirty="0" err="1" smtClean="0"/>
+              <a:t>moveTo</a:t>
+            </a:r>
+            <a:endParaRPr lang="en-US" dirty="0" smtClean="0"/>
+          </a:p>
+          <a:p>
+            <a:pPr lvl="1"/>
+            <a:r>
+              <a:rPr lang="en-US" dirty="0" err="1" smtClean="0"/>
+              <a:t>lineTo</a:t>
+            </a:r>
+            <a:endParaRPr lang="en-US" dirty="0" smtClean="0"/>
+          </a:p>
+          <a:p>
+            <a:pPr lvl="1"/>
+            <a:r>
+              <a:rPr lang="en-US" dirty="0" err="1" smtClean="0"/>
+              <a:t>closePath</a:t>
+            </a:r>
+            <a:endParaRPr lang="en-US" dirty="0" smtClean="0"/>
+          </a:p>
+          <a:p>
+            <a:pPr lvl="1"/>
+            <a:r>
+              <a:rPr lang="en-US" dirty="0"/>
+              <a:t>c</a:t>
+            </a:r>
+            <a:r>
+              <a:rPr lang="en-US" dirty="0" smtClean="0"/>
+              <a:t>lip</a:t>
+            </a:r>
+          </a:p>
+          <a:p>
+            <a:pPr lvl="1"/>
+            <a:r>
+              <a:rPr lang="en-US" dirty="0" err="1" smtClean="0"/>
+              <a:t>rect</a:t>
+            </a:r>
+            <a:endParaRPr lang="en-US" dirty="0" smtClean="0"/>
+          </a:p>
+          <a:p>
+            <a:pPr lvl="1"/>
+            <a:r>
+              <a:rPr lang="en-US" dirty="0" smtClean="0"/>
+              <a:t>arc</a:t>
+            </a:r>
+          </a:p>
+          <a:p>
+            <a:pPr lvl="1"/>
+            <a:r>
+              <a:rPr lang="ru-RU" dirty="0" smtClean="0"/>
+              <a:t>С</a:t>
+            </a:r>
+            <a:r>
+              <a:rPr lang="en-US" dirty="0" err="1" smtClean="0"/>
+              <a:t>urve</a:t>
+            </a:r>
+            <a:endParaRPr lang="en-US" dirty="0" smtClean="0"/>
+          </a:p>
+          <a:p>
+            <a:pPr lvl="2"/>
+            <a:r>
+              <a:rPr lang="en-US" dirty="0" err="1" smtClean="0"/>
+              <a:t>lineCap</a:t>
+            </a:r>
+            <a:r>
+              <a:rPr lang="en-US" dirty="0" smtClean="0"/>
+              <a:t>(square, round)</a:t>
+            </a:r>
+          </a:p>
+          <a:p>
+            <a:pPr lvl="2"/>
+            <a:r>
+              <a:rPr lang="en-US" dirty="0" err="1" smtClean="0"/>
+              <a:t>lineWidth</a:t>
+            </a:r>
+            <a:endParaRPr lang="en-US" dirty="0" smtClean="0"/>
+          </a:p>
+          <a:p>
+            <a:pPr lvl="1"/>
+            <a:endParaRPr lang="ru-RU" dirty="0"/>
+          </a:p>
+        </p:txBody>
+      </p:sp>
+      <p:pic>
+        <p:nvPicPr>
+          <p:cNvPr id="1026" name="Picture 2" descr="An arc"/>
+          <p:cNvPicPr>
+            <a:picLocks noChangeAspect="1" noChangeArrowheads="1"/>
+          </p:cNvPicPr>
+          <p:nvPr/>
+        </p:nvPicPr>
+        <p:blipFill>
+          <a:blip r:embed="rId2">
+            <a:extLst>
+              <a:ext uri="{28A0092B-C50C-407E-A947-70E740481C1C}">
+                <a14:useLocalDpi xmlns:a14="http://schemas.microsoft.com/office/drawing/2010/main" val="0"/>
+              </a:ext>
+            </a:extLst>
+          </a:blip>
+          <a:srcRect/>
+          <a:stretch>
+            <a:fillRect/>
+          </a:stretch>
+        </p:blipFill>
+        <p:spPr bwMode="auto">
+          <a:xfrm>
+            <a:off x="4138307" y="3626592"/>
+            <a:ext cx="2876550" cy="1447801"/>
+          </a:xfrm>
+          <a:prstGeom prst="rect">
+            <a:avLst/>
+          </a:prstGeom>
+          <a:noFill/>
+          <a:extLst>
+            <a:ext uri="{909E8E84-426E-40DD-AFC4-6F175D3DCCD1}">
+              <a14:hiddenFill xmlns:a14="http://schemas.microsoft.com/office/drawing/2010/main">
+                <a:solidFill>
+                  <a:srgbClr val="FFFFFF"/>
+                </a:solidFill>
+              </a14:hiddenFill>
+            </a:ext>
+          </a:extLst>
+        </p:spPr>
+      </p:pic>
+      <p:pic>
+        <p:nvPicPr>
+          <p:cNvPr id="4" name="Picture 3"/>
+          <p:cNvPicPr>
+            <a:picLocks noChangeAspect="1"/>
+          </p:cNvPicPr>
+          <p:nvPr/>
+        </p:nvPicPr>
+        <p:blipFill>
+          <a:blip r:embed="rId3"/>
+          <a:stretch>
+            <a:fillRect/>
+          </a:stretch>
+        </p:blipFill>
+        <p:spPr>
+          <a:xfrm>
+            <a:off x="7637681" y="1027014"/>
+            <a:ext cx="2876550" cy="1447800"/>
+          </a:xfrm>
+          <a:prstGeom prst="rect">
+            <a:avLst/>
+          </a:prstGeom>
+        </p:spPr>
+      </p:pic>
+      <p:pic>
+        <p:nvPicPr>
+          <p:cNvPr id="1028" name="Picture 4" descr="A cubic bezier curve"/>
+          <p:cNvPicPr>
+            <a:picLocks noChangeAspect="1" noChangeArrowheads="1"/>
+          </p:cNvPicPr>
+          <p:nvPr/>
+        </p:nvPicPr>
+        <p:blipFill>
+          <a:blip r:embed="rId4">
+            <a:extLst>
+              <a:ext uri="{28A0092B-C50C-407E-A947-70E740481C1C}">
+                <a14:useLocalDpi xmlns:a14="http://schemas.microsoft.com/office/drawing/2010/main" val="0"/>
+              </a:ext>
+            </a:extLst>
+          </a:blip>
+          <a:srcRect/>
+          <a:stretch>
+            <a:fillRect/>
+          </a:stretch>
+        </p:blipFill>
+        <p:spPr bwMode="auto">
+          <a:xfrm>
+            <a:off x="7252526" y="2998776"/>
+            <a:ext cx="2876550" cy="1447801"/>
+          </a:xfrm>
+          <a:prstGeom prst="rect">
+            <a:avLst/>
+          </a:prstGeom>
+          <a:noFill/>
+          <a:extLst>
+            <a:ext uri="{909E8E84-426E-40DD-AFC4-6F175D3DCCD1}">
+              <a14:hiddenFill xmlns:a14="http://schemas.microsoft.com/office/drawing/2010/main">
+                <a:solidFill>
+                  <a:srgbClr val="FFFFFF"/>
+                </a:solidFill>
+              </a14:hiddenFill>
+            </a:ext>
+          </a:extLst>
+        </p:spPr>
+      </p:pic>
+    </p:spTree>
+    <p:extLst>
+      <p:ext uri="{BB962C8B-B14F-4D97-AF65-F5344CB8AC3E}">
+        <p14:creationId xmlns:p14="http://schemas.microsoft.com/office/powerpoint/2010/main" val="4020672700"/>
+      </p:ext>
+    </p:extLst>
+  </p:cSld>
+  <p:clrMapOvr>
+    <a:masterClrMapping/>
+  </p:clrMapOvr>
+</p:sld>
+</file>
+
+<file path=ppt/slides/slide8.xml><?xml version="1.0" encoding="utf-8"?>
+<p:sld xmlns:a="http://schemas.openxmlformats.org/drawingml/2006/main" xmlns:r="http://schemas.openxmlformats.org/officeDocument/2006/relationships" xmlns:p="http://schemas.openxmlformats.org/presentationml/2006/main">
+  <p:cSld>
+    <p:spTree>
+      <p:nvGrpSpPr>
+        <p:cNvPr id="1" name=""/>
+        <p:cNvGrpSpPr/>
+        <p:nvPr/>
+      </p:nvGrpSpPr>
+      <p:grpSpPr>
+        <a:xfrm>
+          <a:off x="0" y="0"/>
+          <a:ext cx="0" cy="0"/>
+          <a:chOff x="0" y="0"/>
+          <a:chExt cx="0" cy="0"/>
+        </a:xfrm>
+      </p:grpSpPr>
+      <p:sp>
+        <p:nvSpPr>
+          <p:cNvPr id="2" name="Title 1"/>
+          <p:cNvSpPr>
+            <a:spLocks noGrp="1"/>
+          </p:cNvSpPr>
+          <p:nvPr>
+            <p:ph type="title"/>
+          </p:nvPr>
+        </p:nvSpPr>
+        <p:spPr/>
+        <p:txBody>
+          <a:bodyPr/>
+          <a:lstStyle/>
+          <a:p>
+            <a:r>
+              <a:rPr lang="en-US" dirty="0" smtClean="0"/>
+              <a:t>DEMO 3</a:t>
+            </a:r>
+            <a:endParaRPr lang="ru-RU" dirty="0"/>
+          </a:p>
+        </p:txBody>
+      </p:sp>
+      <p:sp>
+        <p:nvSpPr>
+          <p:cNvPr id="3" name="Content Placeholder 2"/>
+          <p:cNvSpPr>
+            <a:spLocks noGrp="1"/>
+          </p:cNvSpPr>
+          <p:nvPr>
+            <p:ph idx="1"/>
+          </p:nvPr>
+        </p:nvSpPr>
+        <p:spPr/>
+        <p:txBody>
+          <a:bodyPr/>
+          <a:lstStyle/>
+          <a:p>
+            <a:endParaRPr lang="ru-RU"/>
+          </a:p>
+        </p:txBody>
+      </p:sp>
+    </p:spTree>
+    <p:extLst>
+      <p:ext uri="{BB962C8B-B14F-4D97-AF65-F5344CB8AC3E}">
+        <p14:creationId xmlns:p14="http://schemas.microsoft.com/office/powerpoint/2010/main" val="4260975929"/>
+      </p:ext>
+    </p:extLst>
+  </p:cSld>
+  <p:clrMapOvr>
+    <a:masterClrMapping/>
+  </p:clrMapOvr>
+</p:sld>
+</file>
+
+<file path=ppt/slides/slide9.xml><?xml version="1.0" encoding="utf-8"?>
+<p:sld xmlns:a="http://schemas.openxmlformats.org/drawingml/2006/main" xmlns:r="http://schemas.openxmlformats.org/officeDocument/2006/relationships" xmlns:p="http://schemas.openxmlformats.org/presentationml/2006/main">
+  <p:cSld>
+    <p:spTree>
+      <p:nvGrpSpPr>
+        <p:cNvPr id="1" name=""/>
+        <p:cNvGrpSpPr/>
+        <p:nvPr/>
+      </p:nvGrpSpPr>
+      <p:grpSpPr>
+        <a:xfrm>
+          <a:off x="0" y="0"/>
+          <a:ext cx="0" cy="0"/>
+          <a:chOff x="0" y="0"/>
+          <a:chExt cx="0" cy="0"/>
+        </a:xfrm>
+      </p:grpSpPr>
+      <p:sp>
+        <p:nvSpPr>
+          <p:cNvPr id="2" name="Title 1"/>
+          <p:cNvSpPr>
+            <a:spLocks noGrp="1"/>
+          </p:cNvSpPr>
+          <p:nvPr>
+            <p:ph type="title"/>
+          </p:nvPr>
+        </p:nvSpPr>
+        <p:spPr/>
+        <p:txBody>
+          <a:bodyPr/>
+          <a:lstStyle/>
+          <a:p>
+            <a:r>
+              <a:rPr lang="ru-RU" dirty="0" smtClean="0"/>
+              <a:t>Текст</a:t>
+            </a:r>
+            <a:endParaRPr lang="ru-RU" dirty="0"/>
+          </a:p>
+        </p:txBody>
+      </p:sp>
+      <p:sp>
+        <p:nvSpPr>
+          <p:cNvPr id="3" name="Content Placeholder 2"/>
+          <p:cNvSpPr>
+            <a:spLocks noGrp="1"/>
+          </p:cNvSpPr>
+          <p:nvPr>
+            <p:ph idx="1"/>
+          </p:nvPr>
+        </p:nvSpPr>
+        <p:spPr/>
+        <p:txBody>
+          <a:bodyPr/>
+          <a:lstStyle/>
+          <a:p>
+            <a:r>
+              <a:rPr lang="ru-RU" dirty="0" smtClean="0"/>
+              <a:t>Шрифт – как в </a:t>
+            </a:r>
+            <a:r>
+              <a:rPr lang="en-US" dirty="0" smtClean="0"/>
+              <a:t>CSS</a:t>
+            </a:r>
+          </a:p>
+          <a:p>
+            <a:pPr lvl="1"/>
+            <a:r>
+              <a:rPr lang="en-US" dirty="0" err="1" smtClean="0"/>
+              <a:t>textAlign</a:t>
+            </a:r>
+            <a:endParaRPr lang="en-US" dirty="0" smtClean="0"/>
+          </a:p>
+          <a:p>
+            <a:r>
+              <a:rPr lang="en-US" dirty="0" err="1" smtClean="0"/>
+              <a:t>textBaseLine</a:t>
+            </a:r>
+            <a:r>
+              <a:rPr lang="en-US" dirty="0" smtClean="0"/>
+              <a:t> – </a:t>
+            </a:r>
+            <a:r>
+              <a:rPr lang="ru-RU" dirty="0" err="1" smtClean="0"/>
+              <a:t>верикальое</a:t>
+            </a:r>
+            <a:r>
+              <a:rPr lang="ru-RU" dirty="0" smtClean="0"/>
+              <a:t> </a:t>
+            </a:r>
+            <a:r>
+              <a:rPr lang="ru-RU" dirty="0" err="1" smtClean="0"/>
+              <a:t>выравниевание</a:t>
+            </a:r>
+            <a:endParaRPr lang="ru-RU" dirty="0" smtClean="0"/>
+          </a:p>
+          <a:p>
+            <a:r>
+              <a:rPr lang="en-US" dirty="0" err="1" smtClean="0"/>
+              <a:t>measureText</a:t>
+            </a:r>
+            <a:r>
+              <a:rPr lang="en-US" dirty="0" smtClean="0"/>
+              <a:t>(text)</a:t>
+            </a:r>
+            <a:endParaRPr lang="ru-RU" dirty="0"/>
+          </a:p>
+        </p:txBody>
+      </p:sp>
+    </p:spTree>
+    <p:extLst>
+      <p:ext uri="{BB962C8B-B14F-4D97-AF65-F5344CB8AC3E}">
+        <p14:creationId xmlns:p14="http://schemas.microsoft.com/office/powerpoint/2010/main" val="2620644838"/>
       </p:ext>
     </p:extLst>
   </p:cSld>

</xml_diff>